<commit_message>
edits to presentation notes
</commit_message>
<xml_diff>
--- a/For Report/Presentation.pptx
+++ b/For Report/Presentation.pptx
@@ -28294,7 +28294,7 @@
           <a:p>
             <a:r>
               <a:rPr lang="en-GB" dirty="0"/>
-              <a:t>Welcome to our analysis of transportation of the UK. </a:t>
+              <a:t>Good evening, we are the Spider Cartographers, and we’re going to explain how we chose to analyse and visualize transportation in the UK….so buckle up </a:t>
             </a:r>
           </a:p>
           <a:p>
@@ -28303,8 +28303,19 @@
           <a:p>
             <a:r>
               <a:rPr lang="en-GB" dirty="0"/>
-              <a:t>We will first begin with a presentation of the data side by the data team, which will be followed up by an exploration of the website by the website team</a:t>
+              <a:t>We will first begin with a presentation of the data </a:t>
             </a:r>
+            <a:r>
+              <a:rPr lang="en-GB" dirty="0" err="1"/>
+              <a:t>sid</a:t>
+            </a:r>
+            <a:r>
+              <a:rPr lang="en-GB" dirty="0"/>
+              <a:t>, which will be followed up by an exploration of the website</a:t>
+            </a:r>
+          </a:p>
+          <a:p>
+            <a:endParaRPr lang="en-GB" dirty="0"/>
           </a:p>
         </p:txBody>
       </p:sp>
@@ -29251,7 +29262,7 @@
           <a:p>
             <a:r>
               <a:rPr lang="en-GB" dirty="0"/>
-              <a:t>First of all, The purpose of our analysis was to be able to inform both policy and the general public of the differences in transport usage to travel to work across England and Wales. This would therefore allow for the identification of areas that could possible benefit from policies and investment that could shift travel towards more sustainable modes</a:t>
+              <a:t>Ok what was our purpose? We want to gain a better understanding of how transport is experienced throughout the UK. Such an understanding can be used to inform both policy and the general public. </a:t>
             </a:r>
           </a:p>
           <a:p>
@@ -29260,7 +29271,25 @@
           <a:p>
             <a:r>
               <a:rPr lang="en-GB" dirty="0"/>
-              <a:t>Therefore, the aims of our analysis and website was to be able to identify and group different transport profiles across England and Wales at the MSOA level. These groups could then be mapped, along with transport flows, to see the geographic distribution of transport usage. Finally, using these profiles we could see what demographic factors relate to the way in which we may use transport</a:t>
+              <a:t>As the UK shifts towards more sustainable modes of transport, our work aims to improve understanding of the current transportation ecosystem so as to better inform such a shift. </a:t>
+            </a:r>
+          </a:p>
+          <a:p>
+            <a:endParaRPr lang="en-GB" dirty="0"/>
+          </a:p>
+          <a:p>
+            <a:r>
+              <a:rPr lang="en-GB" dirty="0"/>
+              <a:t>Therefore, the aims of our analysis and website was to be able to identify and group different transport profiles across England and Wales at the MSOA level. These groups could then be mapped, along with transport flows, to see the geographic distribution of transport usage. </a:t>
+            </a:r>
+          </a:p>
+          <a:p>
+            <a:endParaRPr lang="en-GB" dirty="0"/>
+          </a:p>
+          <a:p>
+            <a:r>
+              <a:rPr lang="en-GB" dirty="0"/>
+              <a:t>We also demonstrate how we can use the identified profiles to see what demographic factors relate to the way in which we may use transport</a:t>
             </a:r>
           </a:p>
         </p:txBody>
@@ -29347,7 +29376,7 @@
           <a:p>
             <a:r>
               <a:rPr lang="en-GB" dirty="0"/>
-              <a:t>In order to be able to run our analysis we had to gather the data, clean it, transform it and perform standardisation</a:t>
+              <a:t>Before identifying these transport profiles, there were a few steps we had to go through: gathering the data, cleaning it, transforming it and standardizing it</a:t>
             </a:r>
           </a:p>
         </p:txBody>
@@ -29434,7 +29463,7 @@
           <a:p>
             <a:r>
               <a:rPr lang="en-GB" dirty="0"/>
-              <a:t>For this to work we required data on transportation usage across England and Wales. This was gathered at the MSOA given that this was the lowest geographical scale for which data was available, and which could subsequently be aggregated up to higher scales if required. The datasets covered transport access nodes, car ownership, commuter flow data between MSOAs and travel time which is a proxy for accessibility. </a:t>
+              <a:t>For this to work we required data on transportation usage across England and Wales. This was gathered at the MSOA  level given that this was the lowest geographical scale for which all data was available. The datasets covered transport access nodes, car ownership, commuter flow data between MSOAs and travel time, the latter being a proxy for accessibility. </a:t>
             </a:r>
           </a:p>
         </p:txBody>
@@ -29521,7 +29550,25 @@
           <a:p>
             <a:r>
               <a:rPr lang="en-GB" dirty="0"/>
-              <a:t>The data that was received was in different formats and not all for our purpose. The first thing we had to do was to group the flows by origin MSOA and turn these into percentages so that they could be readily compared. Secondly, a point in polygon analysis was performed for transport access nodes to see how many transport access nodes were in each MSOA. Finally, we had to turn commuting flows into average travel times and compute an accessibility measure by the time it would take to access all other MSOAs by that transport mode.</a:t>
+              <a:t>The data that was received was in different formats and not all fit for our purpose. Some of the cleaning process we did included</a:t>
+            </a:r>
+          </a:p>
+          <a:p>
+            <a:r>
+              <a:rPr lang="en-GB" dirty="0"/>
+              <a:t>Grouping the flows by origin MSOA and turning them into percentages so that they could be readily compared.</a:t>
+            </a:r>
+          </a:p>
+          <a:p>
+            <a:r>
+              <a:rPr lang="en-GB" dirty="0"/>
+              <a:t>Conducting a point in polygon analysis was for transport access nodes to see how many transport access nodes were in each MSOA. </a:t>
+            </a:r>
+          </a:p>
+          <a:p>
+            <a:r>
+              <a:rPr lang="en-GB" dirty="0"/>
+              <a:t>Weighing travel times between MSOAs by the flows that occur between them. This allowed us to get an average of actual commuting times by mode for each MSOA, which was used as an accessibility metric</a:t>
             </a:r>
           </a:p>
         </p:txBody>
@@ -29608,7 +29655,7 @@
           <a:p>
             <a:r>
               <a:rPr lang="en-GB" dirty="0"/>
-              <a:t>Once the data was cleaned, we had to transform and standardise it. Firstly transformation was used because extremes and outliers will likely influence cluster formation, especially for algorithms using distance-based metrics. Two methods were used because each variable is not skewed in the same degree or necessarily the same direction.</a:t>
+              <a:t>Once the data was cleaned, we had to transform and standardise it. Firstly transformation was used because extremes and outliers are likely influence cluster formation, especially for algorithms using distance-based metrics. Our variables were not skewed in the same degree or necessarily in the same direction, so we used two different transformation techniques</a:t>
             </a:r>
           </a:p>
           <a:p>
@@ -29617,7 +29664,7 @@
           <a:p>
             <a:r>
               <a:rPr lang="en-GB" dirty="0"/>
-              <a:t>Clustering results will also be affected by differences in units, ranges and variations. Therefore the data was standardised. This was done using three different techniques because of the different distribution of each variable even after transformation, so we could compare the results from each.</a:t>
+              <a:t>Clustering results will also be affected by differences in units, ranges and variations. Therefore the data was standardised after transformation. Again due to the different variable distributions, no single standardization technique fit our data best, so we used three in order to compare the result.</a:t>
             </a:r>
           </a:p>
           <a:p>

</xml_diff>

<commit_message>
Notes in presentation doc
</commit_message>
<xml_diff>
--- a/For Report/Presentation.pptx
+++ b/For Report/Presentation.pptx
@@ -8399,8 +8399,8 @@
     <dgm:cxn modelId="{5849D50A-6C4D-4C98-9053-544EE0588558}" type="presOf" srcId="{7F750084-42EA-4577-B90F-847025EB7593}" destId="{BB209859-DC38-40F3-AD2A-AAA91738C07B}" srcOrd="0" destOrd="0" presId="urn:microsoft.com/office/officeart/2018/2/layout/IconVerticalSolidList"/>
     <dgm:cxn modelId="{8740BD46-BBFF-43FE-A6F6-74AC50EB719D}" type="presOf" srcId="{8CF1C6C5-6CD4-4470-B606-AD98465F0A6E}" destId="{10A93BDF-D7A8-4D29-B99D-7CF2EA3DECFF}" srcOrd="0" destOrd="0" presId="urn:microsoft.com/office/officeart/2018/2/layout/IconVerticalSolidList"/>
     <dgm:cxn modelId="{1920BB50-797F-485E-A4AA-6E60095C9D3A}" srcId="{3C5310A5-5DA2-498B-AF63-C559744A8050}" destId="{8CF1C6C5-6CD4-4470-B606-AD98465F0A6E}" srcOrd="2" destOrd="0" parTransId="{FDA866DE-B0D5-4D71-BB51-65CB6E5534DF}" sibTransId="{49A74DEB-30D5-42ED-9CC5-30DC4DAACD92}"/>
+    <dgm:cxn modelId="{F0C03E52-194B-4C0F-9ED5-0752755D91DA}" srcId="{3C5310A5-5DA2-498B-AF63-C559744A8050}" destId="{C53810AD-0D2C-476E-9238-9937B1EFF56B}" srcOrd="3" destOrd="0" parTransId="{B638028B-849B-4A6F-8045-524A342CF68A}" sibTransId="{E90E5BF5-D3E8-40B0-9FAA-680351DEA38E}"/>
     <dgm:cxn modelId="{8F406171-1139-441B-A832-E6AF7C9BCC00}" srcId="{3C5310A5-5DA2-498B-AF63-C559744A8050}" destId="{EFC0DBE2-E4FD-44DE-9CD1-7B43B31AF21F}" srcOrd="0" destOrd="0" parTransId="{841D2595-98F1-4DED-9CF5-EB161BF04FCC}" sibTransId="{9979F5D4-E5E3-4FB9-B1CD-1DC94AD6EB1B}"/>
-    <dgm:cxn modelId="{F0C03E52-194B-4C0F-9ED5-0752755D91DA}" srcId="{3C5310A5-5DA2-498B-AF63-C559744A8050}" destId="{C53810AD-0D2C-476E-9238-9937B1EFF56B}" srcOrd="3" destOrd="0" parTransId="{B638028B-849B-4A6F-8045-524A342CF68A}" sibTransId="{E90E5BF5-D3E8-40B0-9FAA-680351DEA38E}"/>
     <dgm:cxn modelId="{BA53717A-79AC-4647-AD35-D233A94A73B4}" type="presOf" srcId="{C53810AD-0D2C-476E-9238-9937B1EFF56B}" destId="{96CC9E2E-472E-4EF8-A2A8-33EB8E70B8C7}" srcOrd="0" destOrd="0" presId="urn:microsoft.com/office/officeart/2018/2/layout/IconVerticalSolidList"/>
     <dgm:cxn modelId="{FA76CD8B-1D5D-40A4-89EA-2B5581032D5D}" srcId="{3C5310A5-5DA2-498B-AF63-C559744A8050}" destId="{7F750084-42EA-4577-B90F-847025EB7593}" srcOrd="1" destOrd="0" parTransId="{218ECC3E-D3F5-4491-A391-48677F6DA9D4}" sibTransId="{10055B17-ED2E-4C68-956F-00FEDAA89AAA}"/>
     <dgm:cxn modelId="{3FDCADAB-B5E1-4267-8DC4-AA50C4D2435A}" type="presOf" srcId="{3C5310A5-5DA2-498B-AF63-C559744A8050}" destId="{551A8D04-7312-4B5F-8B76-1A94826DAD68}" srcOrd="0" destOrd="0" presId="urn:microsoft.com/office/officeart/2018/2/layout/IconVerticalSolidList"/>
@@ -9092,8 +9092,8 @@
     <dgm:cxn modelId="{7205C41F-E710-054A-A7B3-8B4397E254C3}" type="presOf" srcId="{A5C1B13B-C6BE-4C0F-81EE-A28986259A57}" destId="{385046D1-E92B-DD46-92FC-07E6A1120616}" srcOrd="0" destOrd="0" presId="urn:microsoft.com/office/officeart/2005/8/layout/list1"/>
     <dgm:cxn modelId="{CC06703D-1BA7-D34A-BFAA-FF56819DA506}" type="presOf" srcId="{A5C1B13B-C6BE-4C0F-81EE-A28986259A57}" destId="{BFEA1BDE-E5EF-824E-81DC-DEB0AF9E6425}" srcOrd="1" destOrd="0" presId="urn:microsoft.com/office/officeart/2005/8/layout/list1"/>
     <dgm:cxn modelId="{91F4C940-4C5B-F443-8A3A-826E530EFDDC}" type="presOf" srcId="{7C674C4B-3F03-41E3-893A-AC38ADAFBFF7}" destId="{8248139D-0976-B349-95C9-D61ECFBAB6A2}" srcOrd="0" destOrd="0" presId="urn:microsoft.com/office/officeart/2005/8/layout/list1"/>
+    <dgm:cxn modelId="{DDE3A355-72DC-4DE6-892D-FA542B51232E}" srcId="{A5C1B13B-C6BE-4C0F-81EE-A28986259A57}" destId="{279DE85E-0EF5-40EA-90E4-24868C3C63CF}" srcOrd="1" destOrd="0" parTransId="{A8DECF60-4B80-48E0-91D9-5D3593951FE0}" sibTransId="{515969FD-B579-453F-AA33-C250DECC824D}"/>
     <dgm:cxn modelId="{29CDF86A-37D6-0B40-9F8A-945A9EB665FF}" type="presOf" srcId="{2E97EA98-3AA6-4B30-BCB4-55D84E1BD8B2}" destId="{48AD30DB-9FDE-C140-A591-004BA5B20605}" srcOrd="0" destOrd="0" presId="urn:microsoft.com/office/officeart/2005/8/layout/list1"/>
-    <dgm:cxn modelId="{DDE3A355-72DC-4DE6-892D-FA542B51232E}" srcId="{A5C1B13B-C6BE-4C0F-81EE-A28986259A57}" destId="{279DE85E-0EF5-40EA-90E4-24868C3C63CF}" srcOrd="1" destOrd="0" parTransId="{A8DECF60-4B80-48E0-91D9-5D3593951FE0}" sibTransId="{515969FD-B579-453F-AA33-C250DECC824D}"/>
     <dgm:cxn modelId="{EA86E59A-89E7-D04D-AA72-7353E8431121}" type="presOf" srcId="{C15EE730-7FF1-4676-B132-8C27FC559365}" destId="{4E641AB2-05E7-1E42-A3EF-4E42951554EE}" srcOrd="0" destOrd="0" presId="urn:microsoft.com/office/officeart/2005/8/layout/list1"/>
     <dgm:cxn modelId="{2499C8A4-4BE6-4B9C-8E72-4BC94B9CAAA0}" srcId="{2E97EA98-3AA6-4B30-BCB4-55D84E1BD8B2}" destId="{D7C9BAF3-F6A6-428D-9281-FF7D570CB9BB}" srcOrd="2" destOrd="0" parTransId="{6331D18E-79C4-4A35-9CD5-AFC6E8B80733}" sibTransId="{85248B68-0509-4DC9-A64E-06BF2E70C381}"/>
     <dgm:cxn modelId="{D62F19A6-86C9-45D1-BC50-09061D912484}" type="presOf" srcId="{A0AC8257-5E04-4139-A017-0D5C19B5B699}" destId="{8248139D-0976-B349-95C9-D61ECFBAB6A2}" srcOrd="0" destOrd="1" presId="urn:microsoft.com/office/officeart/2005/8/layout/list1"/>
@@ -10082,9 +10082,9 @@
     <dgm:cxn modelId="{2FA8C10E-5451-3F4A-A285-85DB714E6507}" type="presOf" srcId="{27219D13-BFBA-4AE6-911D-596149A5B84A}" destId="{40ED1348-D01A-4A42-83F7-C5B5343552EB}" srcOrd="0" destOrd="0" presId="urn:microsoft.com/office/officeart/2018/2/layout/IconVerticalSolidList"/>
     <dgm:cxn modelId="{85831A3C-2245-4D81-B036-34040D71B573}" srcId="{BB4CAC3B-F099-486B-9C31-B05446A1524C}" destId="{27219D13-BFBA-4AE6-911D-596149A5B84A}" srcOrd="2" destOrd="0" parTransId="{84B811DD-1543-40E4-B124-05F4102F006D}" sibTransId="{F68A6DDA-00C8-48C2-9807-79D17C450FDF}"/>
     <dgm:cxn modelId="{4E993A3D-F9F4-4377-AD3E-1A89B84DF114}" srcId="{BB4CAC3B-F099-486B-9C31-B05446A1524C}" destId="{0DDA5DF5-FE51-4B5F-9712-BE18FFCADF6D}" srcOrd="0" destOrd="0" parTransId="{A789B275-5EE5-460A-AFF4-F693020EFB38}" sibTransId="{429A6B94-A803-44F1-8CF9-433A2016CA4E}"/>
-    <dgm:cxn modelId="{AFCD3F74-3F3D-2D41-8B02-BF33DB7A0693}" type="presOf" srcId="{0DDA5DF5-FE51-4B5F-9712-BE18FFCADF6D}" destId="{AE1F5567-443E-4F7C-B5A3-94D443D6955F}" srcOrd="0" destOrd="0" presId="urn:microsoft.com/office/officeart/2018/2/layout/IconVerticalSolidList"/>
     <dgm:cxn modelId="{9497A054-91AD-824D-A257-1E282442C14D}" type="presOf" srcId="{A7C5A5A9-AB58-4F41-B2BD-0EF52ACF5831}" destId="{71C17C4E-1629-48AB-836F-90A4B0F47059}" srcOrd="0" destOrd="0" presId="urn:microsoft.com/office/officeart/2018/2/layout/IconVerticalSolidList"/>
     <dgm:cxn modelId="{575AE957-E21A-E441-BC10-4D1BF7687102}" type="presOf" srcId="{DC5972A2-5830-4DAB-B659-D3585E50A11C}" destId="{4116A036-7E54-4B91-9FCF-A8423F0AA2DE}" srcOrd="0" destOrd="0" presId="urn:microsoft.com/office/officeart/2018/2/layout/IconVerticalSolidList"/>
+    <dgm:cxn modelId="{AFCD3F74-3F3D-2D41-8B02-BF33DB7A0693}" type="presOf" srcId="{0DDA5DF5-FE51-4B5F-9712-BE18FFCADF6D}" destId="{AE1F5567-443E-4F7C-B5A3-94D443D6955F}" srcOrd="0" destOrd="0" presId="urn:microsoft.com/office/officeart/2018/2/layout/IconVerticalSolidList"/>
     <dgm:cxn modelId="{649A6B8D-596B-4668-B2A2-142D198B0184}" srcId="{BB4CAC3B-F099-486B-9C31-B05446A1524C}" destId="{A7C5A5A9-AB58-4F41-B2BD-0EF52ACF5831}" srcOrd="1" destOrd="0" parTransId="{7C125992-8252-440D-BF54-372E7DB97AF0}" sibTransId="{351A7FAF-3797-4044-A7FF-661F9774EB3F}"/>
     <dgm:cxn modelId="{881857A1-0D24-48BB-942D-EF78E6E18E81}" srcId="{BB4CAC3B-F099-486B-9C31-B05446A1524C}" destId="{DC5972A2-5830-4DAB-B659-D3585E50A11C}" srcOrd="4" destOrd="0" parTransId="{E47E453A-31E3-4606-A587-2965D6827A4C}" sibTransId="{5E2CDF50-339B-415B-80B3-BE8CCF198DC4}"/>
     <dgm:cxn modelId="{7A467EB7-3E1F-4AE8-9E5D-D6A450DCC5A5}" srcId="{BB4CAC3B-F099-486B-9C31-B05446A1524C}" destId="{82356B97-B3FD-4A43-BFB5-22F1F466C05B}" srcOrd="3" destOrd="0" parTransId="{F7266C86-08AE-4F4F-ACB9-5CC238C66296}" sibTransId="{C2A900EB-2939-4014-A62A-89815EAC44E5}"/>
@@ -10677,10 +10677,10 @@
     <dgm:cxn modelId="{5CFDD631-EAEA-43BD-8EE8-CF5F328FBAF3}" srcId="{3868E049-E2A3-4CAF-865B-2F6F9BDAB382}" destId="{79646247-596E-4F00-91EA-B8BD34166C3B}" srcOrd="1" destOrd="0" parTransId="{6D2D0162-878F-467B-BC3F-9413E2A05D79}" sibTransId="{8A34BA77-7B55-436E-82C3-FC291F70A046}"/>
     <dgm:cxn modelId="{816F4E3A-0742-524D-98EB-7CA4A3F83CCC}" type="presOf" srcId="{062DCA15-74E6-FA46-9C85-978FC47B82BC}" destId="{E3190B73-8D44-7643-9E1C-04FFC4703488}" srcOrd="0" destOrd="1" presId="urn:microsoft.com/office/officeart/2005/8/layout/vList2"/>
     <dgm:cxn modelId="{E4D30A40-BC3F-0341-B43A-5FBF77C99FDC}" type="presOf" srcId="{948CD92F-AC4E-4559-897E-E5F02A63BC1F}" destId="{1C41B893-74B8-3243-AAE4-331E1E2CFA00}" srcOrd="0" destOrd="0" presId="urn:microsoft.com/office/officeart/2005/8/layout/vList2"/>
+    <dgm:cxn modelId="{F1F4944F-D6F8-410C-A681-4902B79499D8}" srcId="{3868E049-E2A3-4CAF-865B-2F6F9BDAB382}" destId="{2414D06E-8C2B-4251-9879-431A327E2D4D}" srcOrd="4" destOrd="0" parTransId="{4EF5C68B-B8D3-424C-B934-BE17915C02F8}" sibTransId="{8E65BF9C-18D9-4684-8582-D31F98F7E101}"/>
+    <dgm:cxn modelId="{1C215D58-A61F-FC49-A8BE-9C2550546183}" type="presOf" srcId="{7D54BC78-5860-4DD6-ACD3-D1102800F20A}" destId="{9527C1E9-9A8B-E847-8ED8-A5A7E6B883C4}" srcOrd="0" destOrd="0" presId="urn:microsoft.com/office/officeart/2005/8/layout/vList2"/>
     <dgm:cxn modelId="{AB7C865B-BE53-CD4B-8054-A628D5D4C0B3}" type="presOf" srcId="{F4767AC8-2D5E-574A-94DA-A2DF7250945D}" destId="{E3190B73-8D44-7643-9E1C-04FFC4703488}" srcOrd="0" destOrd="2" presId="urn:microsoft.com/office/officeart/2005/8/layout/vList2"/>
     <dgm:cxn modelId="{88CB086E-2BA2-2E4C-8F44-50861CD2095D}" type="presOf" srcId="{2414D06E-8C2B-4251-9879-431A327E2D4D}" destId="{72B2D60A-CF7F-9E46-A44C-B15243917451}" srcOrd="0" destOrd="0" presId="urn:microsoft.com/office/officeart/2005/8/layout/vList2"/>
-    <dgm:cxn modelId="{F1F4944F-D6F8-410C-A681-4902B79499D8}" srcId="{3868E049-E2A3-4CAF-865B-2F6F9BDAB382}" destId="{2414D06E-8C2B-4251-9879-431A327E2D4D}" srcOrd="4" destOrd="0" parTransId="{4EF5C68B-B8D3-424C-B934-BE17915C02F8}" sibTransId="{8E65BF9C-18D9-4684-8582-D31F98F7E101}"/>
-    <dgm:cxn modelId="{1C215D58-A61F-FC49-A8BE-9C2550546183}" type="presOf" srcId="{7D54BC78-5860-4DD6-ACD3-D1102800F20A}" destId="{9527C1E9-9A8B-E847-8ED8-A5A7E6B883C4}" srcOrd="0" destOrd="0" presId="urn:microsoft.com/office/officeart/2005/8/layout/vList2"/>
     <dgm:cxn modelId="{0F420B7F-FF43-488D-929E-FC4B48D232C1}" srcId="{3868E049-E2A3-4CAF-865B-2F6F9BDAB382}" destId="{ED207C4C-8ABC-417E-8EA0-10F4EEA4107C}" srcOrd="3" destOrd="0" parTransId="{D0ED32A3-FB22-4A23-A8A7-7354B0763160}" sibTransId="{300A9D04-CABD-46D8-B305-6A72E5F10B91}"/>
     <dgm:cxn modelId="{AC294984-73CD-BE4F-843C-F4832A3BE4C1}" srcId="{A0A542D3-7CB8-8340-9273-B07E2E05A98C}" destId="{062DCA15-74E6-FA46-9C85-978FC47B82BC}" srcOrd="1" destOrd="0" parTransId="{22034C9B-0FFE-B745-A5FD-DB0A408E6714}" sibTransId="{5D4E3E9B-0921-CB48-9DB0-9538D1EFD6A5}"/>
     <dgm:cxn modelId="{07CED791-E927-4D19-BE00-E93A1C5A15B7}" srcId="{3868E049-E2A3-4CAF-865B-2F6F9BDAB382}" destId="{D1454437-8324-41DF-A7D1-FDE6630E366A}" srcOrd="0" destOrd="0" parTransId="{0F41B678-733F-47B2-9A5D-72FD7DEC088D}" sibTransId="{39731C59-A3E6-43FF-A95C-6E5176DC9EF7}"/>
@@ -27940,7 +27940,7 @@
           <a:p>
             <a:fld id="{09D514B4-3185-124C-8E4E-BAD9E5C025E3}" type="datetimeFigureOut">
               <a:rPr lang="en-EG" smtClean="0"/>
-              <a:t>05/21/2020</a:t>
+              <a:t>5/22/20</a:t>
             </a:fld>
             <a:endParaRPr lang="en-EG"/>
           </a:p>
@@ -28254,7 +28254,7 @@
           <a:p>
             <a:r>
               <a:rPr lang="en-GB" dirty="0"/>
-              <a:t>Welcome to our analysis of transportation of the UK. </a:t>
+              <a:t>Good evening, we are the Spider Cartographers, and we’re going to explain how we chose to analyse and visualize transportation in the UK….so buckle up </a:t>
             </a:r>
           </a:p>
           <a:p>
@@ -28263,7 +28263,7 @@
           <a:p>
             <a:r>
               <a:rPr lang="en-GB" dirty="0"/>
-              <a:t>We will first begin with a presentation of the data side by the data team, which will be followed up by an exploration of the website by the website team</a:t>
+              <a:t>We will first begin with a presentation of the data side, which will be followed up by an exploration of the website</a:t>
             </a:r>
           </a:p>
         </p:txBody>
@@ -29211,7 +29211,7 @@
           <a:p>
             <a:r>
               <a:rPr lang="en-GB" dirty="0"/>
-              <a:t>First of all, The purpose of our analysis was to be able to inform both policy and the general public of the differences in transport usage to travel to work across England and Wales. This would therefore allow for the identification of areas that could possible benefit from policies and investment that could shift travel towards more sustainable modes</a:t>
+              <a:t>Ok what was our purpose? We want to gain a better understanding of how transport is experienced throughout the UK. Such an understanding can be used to inform both policy and the general public. </a:t>
             </a:r>
           </a:p>
           <a:p>
@@ -29220,7 +29220,25 @@
           <a:p>
             <a:r>
               <a:rPr lang="en-GB" dirty="0"/>
-              <a:t>Therefore, the aims of our analysis and website was to be able to identify and group different transport profiles across England and Wales at the MSOA level. These groups could then be mapped, along with transport flows, to see the geographic distribution of transport usage. Finally, using these profiles we could see what demographic factors relate to the way in which we may use transport</a:t>
+              <a:t>As the UK shifts towards more sustainable modes of transport, our work aims to improve understanding of the current transportation ecosystem so as to better inform such a shift. </a:t>
+            </a:r>
+          </a:p>
+          <a:p>
+            <a:endParaRPr lang="en-GB" dirty="0"/>
+          </a:p>
+          <a:p>
+            <a:r>
+              <a:rPr lang="en-GB" dirty="0"/>
+              <a:t>Therefore, the aims of our analysis and website was to be able to identify and group different transport profiles across England and Wales at the MSOA level. These groups could then be mapped, along with transport flows, to see the geographic distribution of transport usage. </a:t>
+            </a:r>
+          </a:p>
+          <a:p>
+            <a:endParaRPr lang="en-GB" dirty="0"/>
+          </a:p>
+          <a:p>
+            <a:r>
+              <a:rPr lang="en-GB" dirty="0"/>
+              <a:t>We also demonstrate how we can use the identified profiles to see what demographic factors relate to the way in which we may use transport</a:t>
             </a:r>
           </a:p>
         </p:txBody>
@@ -29305,9 +29323,26 @@
           <a:bodyPr/>
           <a:lstStyle/>
           <a:p>
+            <a:pPr marL="0" marR="0" lvl="0" indent="0" algn="l" defTabSz="914400" rtl="0" eaLnBrk="1" fontAlgn="auto" latinLnBrk="0" hangingPunct="1">
+              <a:lnSpc>
+                <a:spcPct val="100000"/>
+              </a:lnSpc>
+              <a:spcBef>
+                <a:spcPts val="0"/>
+              </a:spcBef>
+              <a:spcAft>
+                <a:spcPts val="0"/>
+              </a:spcAft>
+              <a:buClrTx/>
+              <a:buSzTx/>
+              <a:buFontTx/>
+              <a:buNone/>
+              <a:tabLst/>
+              <a:defRPr/>
+            </a:pPr>
             <a:r>
               <a:rPr lang="en-GB" dirty="0"/>
-              <a:t>In order to be able to run our analysis we had to gather the data, clean it, transform it and perform standardisation</a:t>
+              <a:t>Before identifying these transport profiles, there were a few steps we had to go through: gathering the data, cleaning it, transforming it and standardizing it</a:t>
             </a:r>
           </a:p>
         </p:txBody>
@@ -29394,7 +29429,7 @@
           <a:p>
             <a:r>
               <a:rPr lang="en-GB" dirty="0"/>
-              <a:t>For this to work we required data on transportation usage across England and Wales. This was gathered at the MSOA given that this was the lowest geographical scale for which data was available, and which could subsequently be aggregated up to higher scales if required. The datasets covered transport access nodes, car ownership, commuter flow data between MSOAs and travel time which is a proxy for accessibility. </a:t>
+              <a:t>For this to work we required data on transportation usage across England and Wales. This was gathered at the MSOA  level given that this was the lowest geographical scale for which all data was available. The datasets covered transport access nodes, car ownership, commuter flow data between MSOAs and travel time, the latter being a proxy for accessibility. </a:t>
             </a:r>
           </a:p>
         </p:txBody>
@@ -29481,7 +29516,25 @@
           <a:p>
             <a:r>
               <a:rPr lang="en-GB" dirty="0"/>
-              <a:t>The data that was received was in different formats and not all for our purpose. The first thing we had to do was to group the flows by origin MSOA and turn these into percentages so that they could be readily compared. Secondly, a point in polygon analysis was performed for transport access nodes to see how many transport access nodes were in each MSOA. Finally, we had to turn commuting flows into average travel times and compute an accessibility measure by the time it would take to access all other MSOAs by that transport mode.</a:t>
+              <a:t>The data that was received was in different formats and not all fit for our purpose. Some of the cleaning process we did included</a:t>
+            </a:r>
+          </a:p>
+          <a:p>
+            <a:r>
+              <a:rPr lang="en-GB" dirty="0"/>
+              <a:t>Grouping the flows by origin MSOA and turning them into percentages so that they could be readily compared.</a:t>
+            </a:r>
+          </a:p>
+          <a:p>
+            <a:r>
+              <a:rPr lang="en-GB" dirty="0"/>
+              <a:t>Conducting a point in polygon analysis was for transport access nodes to see how many transport access nodes were in each MSOA. </a:t>
+            </a:r>
+          </a:p>
+          <a:p>
+            <a:r>
+              <a:rPr lang="en-GB" dirty="0"/>
+              <a:t>Weighing travel times between MSOAs by the flows that occur between them. This allowed us to get an average of actual commuting times by mode for each MSOA, which was used as an accessibility metric</a:t>
             </a:r>
           </a:p>
         </p:txBody>
@@ -29568,7 +29621,7 @@
           <a:p>
             <a:r>
               <a:rPr lang="en-GB" dirty="0"/>
-              <a:t>Once the data was cleaned, we had to transform and standardise it. Firstly transformation was used because extremes and outliers will likely influence cluster formation, especially for algorithms using distance-based metrics. Two methods were used because each variable is not skewed in the same degree or necessarily the same direction.</a:t>
+              <a:t>Once the data was cleaned, we had to transform and standardise it. Firstly transformation was used because extremes and outliers are likely influence cluster formation, especially for algorithms using distance-based metrics. Our variables were not skewed in the same degree or necessarily in the same direction, so we used two different transformation techniques</a:t>
             </a:r>
           </a:p>
           <a:p>
@@ -29577,7 +29630,7 @@
           <a:p>
             <a:r>
               <a:rPr lang="en-GB" dirty="0"/>
-              <a:t>Clustering results will also be affected by differences in units, ranges and variations. Therefore the data was standardised. This was done using three different techniques because of the different distribution of each variable even after transformation, so we could compare the results from each.</a:t>
+              <a:t>Clustering results will also be affected by differences in units, ranges and variations. Therefore the data was standardised after transformation. Again due to the different variable distributions, no single standardization technique fit our data best, so we used three in order to compare the result.</a:t>
             </a:r>
           </a:p>
           <a:p>
@@ -30086,7 +30139,7 @@
           <a:p>
             <a:fld id="{7D350A85-E636-47FB-855E-5E507C99E4E4}" type="datetimeFigureOut">
               <a:rPr lang="en-GB" smtClean="0"/>
-              <a:t>21/05/2020</a:t>
+              <a:t>22/05/2020</a:t>
             </a:fld>
             <a:endParaRPr lang="en-GB"/>
           </a:p>
@@ -30256,7 +30309,7 @@
           <a:p>
             <a:fld id="{7D350A85-E636-47FB-855E-5E507C99E4E4}" type="datetimeFigureOut">
               <a:rPr lang="en-GB" smtClean="0"/>
-              <a:t>21/05/2020</a:t>
+              <a:t>22/05/2020</a:t>
             </a:fld>
             <a:endParaRPr lang="en-GB"/>
           </a:p>
@@ -30436,7 +30489,7 @@
           <a:p>
             <a:fld id="{7D350A85-E636-47FB-855E-5E507C99E4E4}" type="datetimeFigureOut">
               <a:rPr lang="en-GB" smtClean="0"/>
-              <a:t>21/05/2020</a:t>
+              <a:t>22/05/2020</a:t>
             </a:fld>
             <a:endParaRPr lang="en-GB"/>
           </a:p>
@@ -30606,7 +30659,7 @@
           <a:p>
             <a:fld id="{7D350A85-E636-47FB-855E-5E507C99E4E4}" type="datetimeFigureOut">
               <a:rPr lang="en-GB" smtClean="0"/>
-              <a:t>21/05/2020</a:t>
+              <a:t>22/05/2020</a:t>
             </a:fld>
             <a:endParaRPr lang="en-GB"/>
           </a:p>
@@ -30874,7 +30927,7 @@
           <a:p>
             <a:fld id="{7D350A85-E636-47FB-855E-5E507C99E4E4}" type="datetimeFigureOut">
               <a:rPr lang="en-GB" smtClean="0"/>
-              <a:t>21/05/2020</a:t>
+              <a:t>22/05/2020</a:t>
             </a:fld>
             <a:endParaRPr lang="en-GB"/>
           </a:p>
@@ -31106,7 +31159,7 @@
           <a:p>
             <a:fld id="{7D350A85-E636-47FB-855E-5E507C99E4E4}" type="datetimeFigureOut">
               <a:rPr lang="en-GB" smtClean="0"/>
-              <a:t>21/05/2020</a:t>
+              <a:t>22/05/2020</a:t>
             </a:fld>
             <a:endParaRPr lang="en-GB"/>
           </a:p>
@@ -31461,7 +31514,7 @@
           <a:p>
             <a:fld id="{7D350A85-E636-47FB-855E-5E507C99E4E4}" type="datetimeFigureOut">
               <a:rPr lang="en-GB" smtClean="0"/>
-              <a:t>21/05/2020</a:t>
+              <a:t>22/05/2020</a:t>
             </a:fld>
             <a:endParaRPr lang="en-GB"/>
           </a:p>
@@ -31602,7 +31655,7 @@
           <a:p>
             <a:fld id="{7D350A85-E636-47FB-855E-5E507C99E4E4}" type="datetimeFigureOut">
               <a:rPr lang="en-GB" smtClean="0"/>
-              <a:t>21/05/2020</a:t>
+              <a:t>22/05/2020</a:t>
             </a:fld>
             <a:endParaRPr lang="en-GB"/>
           </a:p>
@@ -31697,7 +31750,7 @@
           <a:p>
             <a:fld id="{7D350A85-E636-47FB-855E-5E507C99E4E4}" type="datetimeFigureOut">
               <a:rPr lang="en-GB" smtClean="0"/>
-              <a:t>21/05/2020</a:t>
+              <a:t>22/05/2020</a:t>
             </a:fld>
             <a:endParaRPr lang="en-GB"/>
           </a:p>
@@ -32054,7 +32107,7 @@
           <a:p>
             <a:fld id="{7D350A85-E636-47FB-855E-5E507C99E4E4}" type="datetimeFigureOut">
               <a:rPr lang="en-GB" smtClean="0"/>
-              <a:t>21/05/2020</a:t>
+              <a:t>22/05/2020</a:t>
             </a:fld>
             <a:endParaRPr lang="en-GB"/>
           </a:p>
@@ -32410,7 +32463,7 @@
           <a:p>
             <a:fld id="{7D350A85-E636-47FB-855E-5E507C99E4E4}" type="datetimeFigureOut">
               <a:rPr lang="en-GB" smtClean="0"/>
-              <a:t>21/05/2020</a:t>
+              <a:t>22/05/2020</a:t>
             </a:fld>
             <a:endParaRPr lang="en-GB"/>
           </a:p>
@@ -32650,7 +32703,7 @@
           <a:p>
             <a:fld id="{7D350A85-E636-47FB-855E-5E507C99E4E4}" type="datetimeFigureOut">
               <a:rPr lang="en-GB" smtClean="0"/>
-              <a:t>21/05/2020</a:t>
+              <a:t>22/05/2020</a:t>
             </a:fld>
             <a:endParaRPr lang="en-GB"/>
           </a:p>

</xml_diff>